<commit_message>
Correction and analysis of the performance validation
</commit_message>
<xml_diff>
--- a/Analysis drafts/Miscellaneous/Approach CP und QR.pptx
+++ b/Analysis drafts/Miscellaneous/Approach CP und QR.pptx
@@ -6742,8 +6742,8 @@
         </p:nvSpPr>
         <p:spPr>
           <a:xfrm>
-            <a:off x="838200" y="190027"/>
-            <a:ext cx="10515600" cy="675735"/>
+            <a:off x="838200" y="102478"/>
+            <a:ext cx="10515600" cy="442271"/>
           </a:xfrm>
         </p:spPr>
         <p:txBody>
@@ -6778,8 +6778,8 @@
         </p:nvSpPr>
         <p:spPr>
           <a:xfrm>
-            <a:off x="642025" y="943583"/>
-            <a:ext cx="11089532" cy="1334104"/>
+            <a:off x="0" y="642025"/>
+            <a:ext cx="12192000" cy="2130358"/>
           </a:xfrm>
         </p:spPr>
         <p:txBody>
@@ -6790,12 +6790,6 @@
           <a:p>
             <a:r>
               <a:rPr lang="de-DE" dirty="0"/>
-              <a:t>Gibt meist gute Ergebnisse</a:t>
-            </a:r>
-          </a:p>
-          <a:p>
-            <a:r>
-              <a:rPr lang="de-DE" dirty="0"/>
               <a:t>Versuche mit </a:t>
             </a:r>
             <a:r>
@@ -6820,7 +6814,7 @@
             </a:r>
             <a:r>
               <a:rPr lang="de-DE" dirty="0"/>
-              <a:t>für Training und Test (132 Kombinationen für </a:t>
+              <a:t>für alte und neue Kohorte (132 Kombinationen für </a:t>
             </a:r>
             <a:r>
               <a:rPr lang="de-DE" dirty="0" err="1"/>
@@ -6842,20 +6836,6 @@
           <a:p>
             <a:r>
               <a:rPr lang="de-DE" dirty="0"/>
-              <a:t>Die </a:t>
-            </a:r>
-            <a:r>
-              <a:rPr lang="de-DE" dirty="0" err="1"/>
-              <a:t>Outlier</a:t>
-            </a:r>
-            <a:r>
-              <a:rPr lang="de-DE" dirty="0"/>
-              <a:t> muss ich mir anschauen</a:t>
-            </a:r>
-          </a:p>
-          <a:p>
-            <a:r>
-              <a:rPr lang="de-DE" dirty="0"/>
               <a:t>Die Graphiken zeigen die </a:t>
             </a:r>
             <a:r>
@@ -6864,7 +6844,96 @@
             </a:r>
             <a:r>
               <a:rPr lang="de-DE" dirty="0"/>
-              <a:t>auf dem Testdataset</a:t>
+              <a:t>auf der neuen Kohorte</a:t>
+            </a:r>
+          </a:p>
+          <a:p>
+            <a:r>
+              <a:rPr lang="de-DE" dirty="0"/>
+              <a:t>Die neuen und alten Kohorten kommen aus den innerhalb eines Monats neu erworbenen Kunden, CP </a:t>
+            </a:r>
+            <a:r>
+              <a:rPr lang="de-DE" dirty="0" err="1"/>
+              <a:t>once</a:t>
+            </a:r>
+            <a:r>
+              <a:rPr lang="de-DE" dirty="0"/>
+              <a:t>: Nur 1x samplen und </a:t>
+            </a:r>
+            <a:r>
+              <a:rPr lang="de-DE" dirty="0" err="1"/>
+              <a:t>quantil</a:t>
+            </a:r>
+            <a:r>
+              <a:rPr lang="de-DE" dirty="0"/>
+              <a:t> nehmen, CP </a:t>
+            </a:r>
+            <a:r>
+              <a:rPr lang="de-DE" dirty="0" err="1"/>
+              <a:t>rep</a:t>
+            </a:r>
+            <a:r>
+              <a:rPr lang="de-DE" dirty="0"/>
+              <a:t>: 50x samplen</a:t>
+            </a:r>
+          </a:p>
+          <a:p>
+            <a:r>
+              <a:rPr lang="de-DE" dirty="0"/>
+              <a:t>Auswertung:</a:t>
+            </a:r>
+          </a:p>
+          <a:p>
+            <a:pPr lvl="1"/>
+            <a:r>
+              <a:rPr lang="de-DE" dirty="0"/>
+              <a:t>Niedrige Werte bei </a:t>
+            </a:r>
+            <a:r>
+              <a:rPr lang="de-DE" dirty="0" err="1"/>
+              <a:t>gift</a:t>
+            </a:r>
+            <a:r>
+              <a:rPr lang="de-DE" dirty="0"/>
+              <a:t>: Bei kurzer Vorhersageperiode („</a:t>
+            </a:r>
+            <a:r>
+              <a:rPr lang="de-DE" dirty="0" err="1"/>
+              <a:t>Validationperiod</a:t>
+            </a:r>
+            <a:r>
+              <a:rPr lang="de-DE" dirty="0"/>
+              <a:t>“) in der das Quantil gebildet wird und langer </a:t>
+            </a:r>
+            <a:r>
+              <a:rPr lang="de-DE" dirty="0" err="1"/>
+              <a:t>Testperiod</a:t>
+            </a:r>
+            <a:r>
+              <a:rPr lang="de-DE" dirty="0"/>
+              <a:t> (wo die Performance herkommt)</a:t>
+            </a:r>
+          </a:p>
+          <a:p>
+            <a:pPr lvl="1"/>
+            <a:r>
+              <a:rPr lang="de-DE" dirty="0"/>
+              <a:t>Kurze </a:t>
+            </a:r>
+            <a:r>
+              <a:rPr lang="de-DE" dirty="0" err="1"/>
+              <a:t>Validationperiod</a:t>
+            </a:r>
+            <a:r>
+              <a:rPr lang="de-DE" dirty="0"/>
+              <a:t> liefert aber nicht grundsätzlich schlechte Ergebnisse</a:t>
+            </a:r>
+          </a:p>
+          <a:p>
+            <a:pPr lvl="1"/>
+            <a:r>
+              <a:rPr lang="de-DE" dirty="0"/>
+              <a:t>Quantile Regression liefert konstant gute Ergebnisse (und wählt praktisch immer die gleichen Parameter aus)</a:t>
             </a:r>
             <a:endParaRPr lang="en-GB" dirty="0"/>
           </a:p>
@@ -6872,10 +6941,10 @@
       </p:sp>
       <p:grpSp>
         <p:nvGrpSpPr>
-          <p:cNvPr id="16" name="Group 15">
-            <a:extLst>
-              <a:ext uri="{FF2B5EF4-FFF2-40B4-BE49-F238E27FC236}">
-                <a16:creationId xmlns:a16="http://schemas.microsoft.com/office/drawing/2014/main" id="{63A99EC6-386D-C67A-2F2B-12706A5B828D}"/>
+          <p:cNvPr id="26" name="Group 25">
+            <a:extLst>
+              <a:ext uri="{FF2B5EF4-FFF2-40B4-BE49-F238E27FC236}">
+                <a16:creationId xmlns:a16="http://schemas.microsoft.com/office/drawing/2014/main" id="{6F7298A8-A089-A819-32B2-DA49FCC821AF}"/>
               </a:ext>
             </a:extLst>
           </p:cNvPr>
@@ -6886,18 +6955,18 @@
         </p:nvGrpSpPr>
         <p:grpSpPr>
           <a:xfrm>
-            <a:off x="0" y="2365236"/>
-            <a:ext cx="12096000" cy="4202885"/>
-            <a:chOff x="0" y="1956652"/>
-            <a:chExt cx="13626198" cy="4734586"/>
+            <a:off x="0" y="2697415"/>
+            <a:ext cx="12132000" cy="4160585"/>
+            <a:chOff x="-30356" y="2549034"/>
+            <a:chExt cx="12759166" cy="4375668"/>
           </a:xfrm>
         </p:grpSpPr>
         <p:pic>
           <p:nvPicPr>
-            <p:cNvPr id="11" name="Picture 10">
+            <p:cNvPr id="23" name="Picture 22">
               <a:extLst>
                 <a:ext uri="{FF2B5EF4-FFF2-40B4-BE49-F238E27FC236}">
-                  <a16:creationId xmlns:a16="http://schemas.microsoft.com/office/drawing/2014/main" id="{3ADFFA41-37A9-1FBF-1DC1-11BACEA6308D}"/>
+                  <a16:creationId xmlns:a16="http://schemas.microsoft.com/office/drawing/2014/main" id="{CD20CCC6-E3B1-F7B0-CCE7-C0C625BB0EF2}"/>
                 </a:ext>
               </a:extLst>
             </p:cNvPr>
@@ -6920,8 +6989,8 @@
           </p:blipFill>
           <p:spPr>
             <a:xfrm>
-              <a:off x="0" y="1956652"/>
-              <a:ext cx="4191585" cy="4734586"/>
+              <a:off x="-30356" y="2549035"/>
+              <a:ext cx="3873829" cy="4375667"/>
             </a:xfrm>
             <a:prstGeom prst="rect">
               <a:avLst/>
@@ -6930,10 +6999,10 @@
         </p:pic>
         <p:pic>
           <p:nvPicPr>
-            <p:cNvPr id="9" name="Picture 8">
+            <p:cNvPr id="19" name="Picture 18">
               <a:extLst>
                 <a:ext uri="{FF2B5EF4-FFF2-40B4-BE49-F238E27FC236}">
-                  <a16:creationId xmlns:a16="http://schemas.microsoft.com/office/drawing/2014/main" id="{E4701125-F82C-6659-C0AE-53F04E4E037C}"/>
+                  <a16:creationId xmlns:a16="http://schemas.microsoft.com/office/drawing/2014/main" id="{7262BE1A-6B5B-2368-B2CE-5007B489735F}"/>
                 </a:ext>
               </a:extLst>
             </p:cNvPr>
@@ -6956,8 +7025,8 @@
           </p:blipFill>
           <p:spPr>
             <a:xfrm>
-              <a:off x="3144871" y="1956652"/>
-              <a:ext cx="4191585" cy="4734586"/>
+              <a:off x="2860778" y="2549035"/>
+              <a:ext cx="3873829" cy="4375667"/>
             </a:xfrm>
             <a:prstGeom prst="rect">
               <a:avLst/>
@@ -6966,10 +7035,10 @@
         </p:pic>
         <p:pic>
           <p:nvPicPr>
-            <p:cNvPr id="15" name="Picture 14">
+            <p:cNvPr id="21" name="Picture 20">
               <a:extLst>
                 <a:ext uri="{FF2B5EF4-FFF2-40B4-BE49-F238E27FC236}">
-                  <a16:creationId xmlns:a16="http://schemas.microsoft.com/office/drawing/2014/main" id="{B270DF91-F41A-1674-F3D3-29069B8CD52A}"/>
+                  <a16:creationId xmlns:a16="http://schemas.microsoft.com/office/drawing/2014/main" id="{98BE1D58-53D1-C641-2392-038BBBA73470}"/>
                 </a:ext>
               </a:extLst>
             </p:cNvPr>
@@ -6992,8 +7061,8 @@
           </p:blipFill>
           <p:spPr>
             <a:xfrm>
-              <a:off x="6289742" y="1956652"/>
-              <a:ext cx="4191585" cy="4734586"/>
+              <a:off x="5783984" y="2549034"/>
+              <a:ext cx="3953067" cy="4375667"/>
             </a:xfrm>
             <a:prstGeom prst="rect">
               <a:avLst/>
@@ -7002,10 +7071,10 @@
         </p:pic>
         <p:pic>
           <p:nvPicPr>
-            <p:cNvPr id="13" name="Picture 12">
+            <p:cNvPr id="25" name="Picture 24">
               <a:extLst>
                 <a:ext uri="{FF2B5EF4-FFF2-40B4-BE49-F238E27FC236}">
-                  <a16:creationId xmlns:a16="http://schemas.microsoft.com/office/drawing/2014/main" id="{685A5662-3347-5337-C5E1-8DDE00F92EEA}"/>
+                  <a16:creationId xmlns:a16="http://schemas.microsoft.com/office/drawing/2014/main" id="{0883B22F-F96E-4190-82C3-03C435B106C1}"/>
                 </a:ext>
               </a:extLst>
             </p:cNvPr>
@@ -7028,8 +7097,8 @@
           </p:blipFill>
           <p:spPr>
             <a:xfrm>
-              <a:off x="9434613" y="1956652"/>
-              <a:ext cx="4191585" cy="4734586"/>
+              <a:off x="8775743" y="2549034"/>
+              <a:ext cx="3953067" cy="4375667"/>
             </a:xfrm>
             <a:prstGeom prst="rect">
               <a:avLst/>

</xml_diff>

<commit_message>
Various changes: - run for many time periods - parametrisation - changed benchmarking - added plots - applied tryCatch to Bayesian and Conformal Prediction
</commit_message>
<xml_diff>
--- a/Analysis drafts/Miscellaneous/Approach CP und QR.pptx
+++ b/Analysis drafts/Miscellaneous/Approach CP und QR.pptx
@@ -286,7 +286,7 @@
           <a:p>
             <a:fld id="{B170CA53-655F-4E19-B7B0-CE606634433A}" type="datetimeFigureOut">
               <a:rPr lang="en-GB" smtClean="0"/>
-              <a:t>21/06/2024</a:t>
+              <a:t>26/06/2024</a:t>
             </a:fld>
             <a:endParaRPr lang="en-GB"/>
           </a:p>
@@ -484,7 +484,7 @@
           <a:p>
             <a:fld id="{B170CA53-655F-4E19-B7B0-CE606634433A}" type="datetimeFigureOut">
               <a:rPr lang="en-GB" smtClean="0"/>
-              <a:t>21/06/2024</a:t>
+              <a:t>26/06/2024</a:t>
             </a:fld>
             <a:endParaRPr lang="en-GB"/>
           </a:p>
@@ -692,7 +692,7 @@
           <a:p>
             <a:fld id="{B170CA53-655F-4E19-B7B0-CE606634433A}" type="datetimeFigureOut">
               <a:rPr lang="en-GB" smtClean="0"/>
-              <a:t>21/06/2024</a:t>
+              <a:t>26/06/2024</a:t>
             </a:fld>
             <a:endParaRPr lang="en-GB"/>
           </a:p>
@@ -890,7 +890,7 @@
           <a:p>
             <a:fld id="{B170CA53-655F-4E19-B7B0-CE606634433A}" type="datetimeFigureOut">
               <a:rPr lang="en-GB" smtClean="0"/>
-              <a:t>21/06/2024</a:t>
+              <a:t>26/06/2024</a:t>
             </a:fld>
             <a:endParaRPr lang="en-GB"/>
           </a:p>
@@ -1165,7 +1165,7 @@
           <a:p>
             <a:fld id="{B170CA53-655F-4E19-B7B0-CE606634433A}" type="datetimeFigureOut">
               <a:rPr lang="en-GB" smtClean="0"/>
-              <a:t>21/06/2024</a:t>
+              <a:t>26/06/2024</a:t>
             </a:fld>
             <a:endParaRPr lang="en-GB"/>
           </a:p>
@@ -1430,7 +1430,7 @@
           <a:p>
             <a:fld id="{B170CA53-655F-4E19-B7B0-CE606634433A}" type="datetimeFigureOut">
               <a:rPr lang="en-GB" smtClean="0"/>
-              <a:t>21/06/2024</a:t>
+              <a:t>26/06/2024</a:t>
             </a:fld>
             <a:endParaRPr lang="en-GB"/>
           </a:p>
@@ -1842,7 +1842,7 @@
           <a:p>
             <a:fld id="{B170CA53-655F-4E19-B7B0-CE606634433A}" type="datetimeFigureOut">
               <a:rPr lang="en-GB" smtClean="0"/>
-              <a:t>21/06/2024</a:t>
+              <a:t>26/06/2024</a:t>
             </a:fld>
             <a:endParaRPr lang="en-GB"/>
           </a:p>
@@ -1983,7 +1983,7 @@
           <a:p>
             <a:fld id="{B170CA53-655F-4E19-B7B0-CE606634433A}" type="datetimeFigureOut">
               <a:rPr lang="en-GB" smtClean="0"/>
-              <a:t>21/06/2024</a:t>
+              <a:t>26/06/2024</a:t>
             </a:fld>
             <a:endParaRPr lang="en-GB"/>
           </a:p>
@@ -2096,7 +2096,7 @@
           <a:p>
             <a:fld id="{B170CA53-655F-4E19-B7B0-CE606634433A}" type="datetimeFigureOut">
               <a:rPr lang="en-GB" smtClean="0"/>
-              <a:t>21/06/2024</a:t>
+              <a:t>26/06/2024</a:t>
             </a:fld>
             <a:endParaRPr lang="en-GB"/>
           </a:p>
@@ -2407,7 +2407,7 @@
           <a:p>
             <a:fld id="{B170CA53-655F-4E19-B7B0-CE606634433A}" type="datetimeFigureOut">
               <a:rPr lang="en-GB" smtClean="0"/>
-              <a:t>21/06/2024</a:t>
+              <a:t>26/06/2024</a:t>
             </a:fld>
             <a:endParaRPr lang="en-GB"/>
           </a:p>
@@ -2695,7 +2695,7 @@
           <a:p>
             <a:fld id="{B170CA53-655F-4E19-B7B0-CE606634433A}" type="datetimeFigureOut">
               <a:rPr lang="en-GB" smtClean="0"/>
-              <a:t>21/06/2024</a:t>
+              <a:t>26/06/2024</a:t>
             </a:fld>
             <a:endParaRPr lang="en-GB"/>
           </a:p>
@@ -2936,7 +2936,7 @@
           <a:p>
             <a:fld id="{B170CA53-655F-4E19-B7B0-CE606634433A}" type="datetimeFigureOut">
               <a:rPr lang="en-GB" smtClean="0"/>
-              <a:t>21/06/2024</a:t>
+              <a:t>26/06/2024</a:t>
             </a:fld>
             <a:endParaRPr lang="en-GB"/>
           </a:p>
@@ -3408,6 +3408,10 @@
             <a:r>
               <a:rPr lang="de-DE" dirty="0" err="1"/>
               <a:t>model</a:t>
+            </a:r>
+            <a:r>
+              <a:rPr lang="de-DE" dirty="0"/>
+              <a:t> </a:t>
             </a:r>
             <a:endParaRPr lang="en-GB" dirty="0"/>
           </a:p>

</xml_diff>